<commit_message>
Just add an changeEtiquette() somewhere.
</commit_message>
<xml_diff>
--- a/Documents/Présentation/Presentation 29-11-16.pptx
+++ b/Documents/Présentation/Presentation 29-11-16.pptx
@@ -1638,15 +1638,24 @@
           <a:lstStyle/>
           <a:p>
             <a:r>
-              <a:rPr lang="fr-FR" sz="2400" dirty="0" smtClean="0"/>
+              <a:rPr lang="fr-FR" sz="2400" dirty="0" smtClean="0">
+                <a:latin typeface="Segoe UI Semilight" panose="020B0402040204020203" pitchFamily="34" charset="0"/>
+                <a:cs typeface="Segoe UI Semilight" panose="020B0402040204020203" pitchFamily="34" charset="0"/>
+              </a:rPr>
               <a:t>Corrections mineurs </a:t>
             </a:r>
             <a:r>
-              <a:rPr lang="fr-FR" sz="2400" dirty="0" err="1" smtClean="0"/>
+              <a:rPr lang="fr-FR" sz="2400" dirty="0" err="1" smtClean="0">
+                <a:latin typeface="Segoe UI Semilight" panose="020B0402040204020203" pitchFamily="34" charset="0"/>
+                <a:cs typeface="Segoe UI Semilight" panose="020B0402040204020203" pitchFamily="34" charset="0"/>
+              </a:rPr>
               <a:t>pretty</a:t>
             </a:r>
             <a:r>
-              <a:rPr lang="fr-FR" sz="2400" dirty="0" smtClean="0"/>
+              <a:rPr lang="fr-FR" sz="2400" dirty="0" smtClean="0">
+                <a:latin typeface="Segoe UI Semilight" panose="020B0402040204020203" pitchFamily="34" charset="0"/>
+                <a:cs typeface="Segoe UI Semilight" panose="020B0402040204020203" pitchFamily="34" charset="0"/>
+              </a:rPr>
               <a:t> printer</a:t>
             </a:r>
           </a:p>
@@ -1656,7 +1665,10 @@
               <a:buChar char="-"/>
             </a:pPr>
             <a:r>
-              <a:rPr lang="fr-FR" sz="2400" dirty="0" smtClean="0"/>
+              <a:rPr lang="fr-FR" sz="2400" dirty="0" smtClean="0">
+                <a:latin typeface="Segoe UI Semilight" panose="020B0402040204020203" pitchFamily="34" charset="0"/>
+                <a:cs typeface="Segoe UI Semilight" panose="020B0402040204020203" pitchFamily="34" charset="0"/>
+              </a:rPr>
               <a:t>Points virgules</a:t>
             </a:r>
           </a:p>
@@ -1666,7 +1678,10 @@
               <a:buChar char="-"/>
             </a:pPr>
             <a:r>
-              <a:rPr lang="fr-FR" sz="2400" dirty="0" smtClean="0"/>
+              <a:rPr lang="fr-FR" sz="2400" dirty="0" smtClean="0">
+                <a:latin typeface="Segoe UI Semilight" panose="020B0402040204020203" pitchFamily="34" charset="0"/>
+                <a:cs typeface="Segoe UI Semilight" panose="020B0402040204020203" pitchFamily="34" charset="0"/>
+              </a:rPr>
               <a:t>Affectations multiples</a:t>
             </a:r>
           </a:p>
@@ -1676,33 +1691,54 @@
               <a:buChar char="-"/>
             </a:pPr>
             <a:r>
-              <a:rPr lang="fr-FR" sz="2400" dirty="0" smtClean="0"/>
+              <a:rPr lang="fr-FR" sz="2400" dirty="0" smtClean="0">
+                <a:latin typeface="Segoe UI Semilight" panose="020B0402040204020203" pitchFamily="34" charset="0"/>
+                <a:cs typeface="Segoe UI Semilight" panose="020B0402040204020203" pitchFamily="34" charset="0"/>
+              </a:rPr>
               <a:t>Expressions </a:t>
             </a:r>
             <a:r>
-              <a:rPr lang="fr-FR" sz="2400" dirty="0" err="1" smtClean="0"/>
+              <a:rPr lang="fr-FR" sz="2400" dirty="0" err="1" smtClean="0">
+                <a:latin typeface="Segoe UI Semilight" panose="020B0402040204020203" pitchFamily="34" charset="0"/>
+                <a:cs typeface="Segoe UI Semilight" panose="020B0402040204020203" pitchFamily="34" charset="0"/>
+              </a:rPr>
               <a:t>parenthèsées</a:t>
             </a:r>
-            <a:endParaRPr lang="fr-FR" sz="2400" dirty="0" smtClean="0"/>
+            <a:endParaRPr lang="fr-FR" sz="2400" dirty="0" smtClean="0">
+              <a:latin typeface="Segoe UI Semilight" panose="020B0402040204020203" pitchFamily="34" charset="0"/>
+              <a:cs typeface="Segoe UI Semilight" panose="020B0402040204020203" pitchFamily="34" charset="0"/>
+            </a:endParaRPr>
           </a:p>
           <a:p>
             <a:pPr marL="285750" indent="-285750">
               <a:buFontTx/>
               <a:buChar char="-"/>
             </a:pPr>
-            <a:endParaRPr lang="fr-FR" sz="2400" dirty="0"/>
-          </a:p>
-          <a:p>
-            <a:r>
-              <a:rPr lang="fr-FR" sz="2400" dirty="0" smtClean="0"/>
+            <a:endParaRPr lang="fr-FR" sz="2400" dirty="0">
+              <a:latin typeface="Segoe UI Semilight" panose="020B0402040204020203" pitchFamily="34" charset="0"/>
+              <a:cs typeface="Segoe UI Semilight" panose="020B0402040204020203" pitchFamily="34" charset="0"/>
+            </a:endParaRPr>
+          </a:p>
+          <a:p>
+            <a:r>
+              <a:rPr lang="fr-FR" sz="2400" dirty="0" smtClean="0">
+                <a:latin typeface="Segoe UI Semilight" panose="020B0402040204020203" pitchFamily="34" charset="0"/>
+                <a:cs typeface="Segoe UI Semilight" panose="020B0402040204020203" pitchFamily="34" charset="0"/>
+              </a:rPr>
               <a:t>Créations de tests unitaires du </a:t>
             </a:r>
             <a:r>
-              <a:rPr lang="fr-FR" sz="2400" dirty="0" err="1" smtClean="0"/>
+              <a:rPr lang="fr-FR" sz="2400" dirty="0" err="1" smtClean="0">
+                <a:latin typeface="Segoe UI Semilight" panose="020B0402040204020203" pitchFamily="34" charset="0"/>
+                <a:cs typeface="Segoe UI Semilight" panose="020B0402040204020203" pitchFamily="34" charset="0"/>
+              </a:rPr>
               <a:t>pretty</a:t>
             </a:r>
             <a:r>
-              <a:rPr lang="fr-FR" sz="2400" dirty="0" smtClean="0"/>
+              <a:rPr lang="fr-FR" sz="2400" dirty="0" smtClean="0">
+                <a:latin typeface="Segoe UI Semilight" panose="020B0402040204020203" pitchFamily="34" charset="0"/>
+                <a:cs typeface="Segoe UI Semilight" panose="020B0402040204020203" pitchFamily="34" charset="0"/>
+              </a:rPr>
               <a:t> printer (Oracle)</a:t>
             </a:r>
           </a:p>
@@ -1711,11 +1747,17 @@
               <a:buFontTx/>
               <a:buChar char="-"/>
             </a:pPr>
-            <a:endParaRPr lang="fr-FR" sz="2400" dirty="0"/>
-          </a:p>
-          <a:p>
-            <a:r>
-              <a:rPr lang="fr-FR" sz="2400" dirty="0" smtClean="0"/>
+            <a:endParaRPr lang="fr-FR" sz="2400" dirty="0">
+              <a:latin typeface="Segoe UI Semilight" panose="020B0402040204020203" pitchFamily="34" charset="0"/>
+              <a:cs typeface="Segoe UI Semilight" panose="020B0402040204020203" pitchFamily="34" charset="0"/>
+            </a:endParaRPr>
+          </a:p>
+          <a:p>
+            <a:r>
+              <a:rPr lang="fr-FR" sz="2400" dirty="0" smtClean="0">
+                <a:latin typeface="Segoe UI Semilight" panose="020B0402040204020203" pitchFamily="34" charset="0"/>
+                <a:cs typeface="Segoe UI Semilight" panose="020B0402040204020203" pitchFamily="34" charset="0"/>
+              </a:rPr>
               <a:t>Construction de la table des symboles</a:t>
             </a:r>
           </a:p>
@@ -1725,7 +1767,10 @@
               <a:buChar char="-"/>
             </a:pPr>
             <a:r>
-              <a:rPr lang="fr-FR" sz="2400" dirty="0" smtClean="0"/>
+              <a:rPr lang="fr-FR" sz="2400" dirty="0" smtClean="0">
+                <a:latin typeface="Segoe UI Semilight" panose="020B0402040204020203" pitchFamily="34" charset="0"/>
+                <a:cs typeface="Segoe UI Semilight" panose="020B0402040204020203" pitchFamily="34" charset="0"/>
+              </a:rPr>
               <a:t>Liste des fonctions</a:t>
             </a:r>
           </a:p>
@@ -1735,7 +1780,10 @@
               <a:buChar char="-"/>
             </a:pPr>
             <a:r>
-              <a:rPr lang="fr-FR" sz="2400" dirty="0" smtClean="0"/>
+              <a:rPr lang="fr-FR" sz="2400" dirty="0" smtClean="0">
+                <a:latin typeface="Segoe UI Semilight" panose="020B0402040204020203" pitchFamily="34" charset="0"/>
+                <a:cs typeface="Segoe UI Semilight" panose="020B0402040204020203" pitchFamily="34" charset="0"/>
+              </a:rPr>
               <a:t>Nombre input / output</a:t>
             </a:r>
           </a:p>
@@ -1745,7 +1793,10 @@
               <a:buChar char="-"/>
             </a:pPr>
             <a:r>
-              <a:rPr lang="fr-FR" sz="2400" dirty="0" smtClean="0"/>
+              <a:rPr lang="fr-FR" sz="2400" dirty="0" smtClean="0">
+                <a:latin typeface="Segoe UI Semilight" panose="020B0402040204020203" pitchFamily="34" charset="0"/>
+                <a:cs typeface="Segoe UI Semilight" panose="020B0402040204020203" pitchFamily="34" charset="0"/>
+              </a:rPr>
               <a:t>Liste des variables d’une fonction via les affectations</a:t>
             </a:r>
           </a:p>
@@ -1754,11 +1805,17 @@
               <a:buFontTx/>
               <a:buChar char="-"/>
             </a:pPr>
-            <a:endParaRPr lang="fr-FR" sz="2400" dirty="0"/>
-          </a:p>
-          <a:p>
-            <a:r>
-              <a:rPr lang="fr-FR" sz="2400" dirty="0" smtClean="0"/>
+            <a:endParaRPr lang="fr-FR" sz="2400" dirty="0">
+              <a:latin typeface="Segoe UI Semilight" panose="020B0402040204020203" pitchFamily="34" charset="0"/>
+              <a:cs typeface="Segoe UI Semilight" panose="020B0402040204020203" pitchFamily="34" charset="0"/>
+            </a:endParaRPr>
+          </a:p>
+          <a:p>
+            <a:r>
+              <a:rPr lang="fr-FR" sz="2400" dirty="0" smtClean="0">
+                <a:latin typeface="Segoe UI Semilight" panose="020B0402040204020203" pitchFamily="34" charset="0"/>
+                <a:cs typeface="Segoe UI Semilight" panose="020B0402040204020203" pitchFamily="34" charset="0"/>
+              </a:rPr>
               <a:t>Construction des premières étiquettes de génération de code</a:t>
             </a:r>
           </a:p>
@@ -1937,11 +1994,17 @@
               <a:buChar char="-"/>
             </a:pPr>
             <a:r>
-              <a:rPr lang="fr-FR" sz="2400" dirty="0" err="1" smtClean="0"/>
+              <a:rPr lang="fr-FR" sz="2400" dirty="0" err="1" smtClean="0">
+                <a:latin typeface="Segoe UI Semilight" panose="020B0402040204020203" pitchFamily="34" charset="0"/>
+                <a:cs typeface="Segoe UI Semilight" panose="020B0402040204020203" pitchFamily="34" charset="0"/>
+              </a:rPr>
               <a:t>Evalution</a:t>
             </a:r>
             <a:r>
-              <a:rPr lang="fr-FR" sz="2400" dirty="0" smtClean="0"/>
+              <a:rPr lang="fr-FR" sz="2400" dirty="0" smtClean="0">
+                <a:latin typeface="Segoe UI Semilight" panose="020B0402040204020203" pitchFamily="34" charset="0"/>
+                <a:cs typeface="Segoe UI Semilight" panose="020B0402040204020203" pitchFamily="34" charset="0"/>
+              </a:rPr>
               <a:t> d’expression (=? Nil)</a:t>
             </a:r>
           </a:p>
@@ -1950,7 +2013,10 @@
               <a:buFontTx/>
               <a:buChar char="-"/>
             </a:pPr>
-            <a:endParaRPr lang="fr-FR" sz="2400" dirty="0" smtClean="0"/>
+            <a:endParaRPr lang="fr-FR" sz="2400" dirty="0" smtClean="0">
+              <a:latin typeface="Segoe UI Semilight" panose="020B0402040204020203" pitchFamily="34" charset="0"/>
+              <a:cs typeface="Segoe UI Semilight" panose="020B0402040204020203" pitchFamily="34" charset="0"/>
+            </a:endParaRPr>
           </a:p>
           <a:p>
             <a:pPr marL="342900" indent="-342900">
@@ -1958,7 +2024,10 @@
               <a:buChar char="-"/>
             </a:pPr>
             <a:r>
-              <a:rPr lang="fr-FR" sz="2400" dirty="0" smtClean="0"/>
+              <a:rPr lang="fr-FR" sz="2400" dirty="0" smtClean="0">
+                <a:latin typeface="Segoe UI Semilight" panose="020B0402040204020203" pitchFamily="34" charset="0"/>
+                <a:cs typeface="Segoe UI Semilight" panose="020B0402040204020203" pitchFamily="34" charset="0"/>
+              </a:rPr>
               <a:t>Tests unitaires sur la table de symbole</a:t>
             </a:r>
           </a:p>
@@ -1967,7 +2036,10 @@
               <a:buFontTx/>
               <a:buChar char="-"/>
             </a:pPr>
-            <a:endParaRPr lang="fr-FR" sz="2400" dirty="0" smtClean="0"/>
+            <a:endParaRPr lang="fr-FR" sz="2400" dirty="0" smtClean="0">
+              <a:latin typeface="Segoe UI Semilight" panose="020B0402040204020203" pitchFamily="34" charset="0"/>
+              <a:cs typeface="Segoe UI Semilight" panose="020B0402040204020203" pitchFamily="34" charset="0"/>
+            </a:endParaRPr>
           </a:p>
           <a:p>
             <a:pPr marL="342900" indent="-342900">
@@ -1975,7 +2047,10 @@
               <a:buChar char="-"/>
             </a:pPr>
             <a:r>
-              <a:rPr lang="fr-FR" sz="2400" dirty="0" smtClean="0"/>
+              <a:rPr lang="fr-FR" sz="2400" dirty="0" smtClean="0">
+                <a:latin typeface="Segoe UI Semilight" panose="020B0402040204020203" pitchFamily="34" charset="0"/>
+                <a:cs typeface="Segoe UI Semilight" panose="020B0402040204020203" pitchFamily="34" charset="0"/>
+              </a:rPr>
               <a:t>Génération de code complète</a:t>
             </a:r>
           </a:p>
@@ -1985,10 +2060,16 @@
               <a:buChar char="-"/>
             </a:pPr>
             <a:r>
-              <a:rPr lang="fr-FR" sz="2400" dirty="0" smtClean="0"/>
-              <a:t>Syntaxe de traduction de code</a:t>
-            </a:r>
-            <a:endParaRPr lang="fr-FR" sz="2400" dirty="0"/>
+              <a:rPr lang="fr-FR" sz="2400" dirty="0" smtClean="0">
+                <a:latin typeface="Segoe UI Semilight" panose="020B0402040204020203" pitchFamily="34" charset="0"/>
+                <a:cs typeface="Segoe UI Semilight" panose="020B0402040204020203" pitchFamily="34" charset="0"/>
+              </a:rPr>
+              <a:t>Schémas de traduction de code</a:t>
+            </a:r>
+            <a:endParaRPr lang="fr-FR" sz="2400" dirty="0">
+              <a:latin typeface="Segoe UI Semilight" panose="020B0402040204020203" pitchFamily="34" charset="0"/>
+              <a:cs typeface="Segoe UI Semilight" panose="020B0402040204020203" pitchFamily="34" charset="0"/>
+            </a:endParaRPr>
           </a:p>
         </p:txBody>
       </p:sp>

</xml_diff>